<commit_message>
Menu superior completo para mobile e desk
</commit_message>
<xml_diff>
--- a/front-end.pptx
+++ b/front-end.pptx
@@ -9,9 +9,11 @@
     <p:sldId id="257" r:id="rId3"/>
     <p:sldId id="258" r:id="rId4"/>
     <p:sldId id="259" r:id="rId5"/>
-    <p:sldId id="260" r:id="rId6"/>
-    <p:sldId id="262" r:id="rId7"/>
-    <p:sldId id="261" r:id="rId8"/>
+    <p:sldId id="263" r:id="rId6"/>
+    <p:sldId id="260" r:id="rId7"/>
+    <p:sldId id="262" r:id="rId8"/>
+    <p:sldId id="264" r:id="rId9"/>
+    <p:sldId id="261" r:id="rId10"/>
   </p:sldIdLst>
   <p:sldSz cx="12192000" cy="6858000"/>
   <p:notesSz cx="6858000" cy="9144000"/>
@@ -5668,7 +5670,11 @@
           <a:p>
             <a:r>
               <a:rPr lang="pt-BR" dirty="0" smtClean="0"/>
-              <a:t>Desenvolvimento - web</a:t>
+              <a:t>Desenvolvimento </a:t>
+            </a:r>
+            <a:r>
+              <a:rPr lang="pt-BR" dirty="0" smtClean="0"/>
+              <a:t>web</a:t>
             </a:r>
             <a:endParaRPr lang="pt-BR" dirty="0"/>
           </a:p>
@@ -5756,8 +5762,16 @@
           <a:lstStyle/>
           <a:p>
             <a:r>
+              <a:rPr lang="pt-BR" dirty="0" smtClean="0"/>
+              <a:t>Desenvolvimento </a:t>
+            </a:r>
+            <a:r>
+              <a:rPr lang="pt-BR" dirty="0" smtClean="0"/>
+              <a:t>web – Front </a:t>
+            </a:r>
+            <a:r>
               <a:rPr lang="pt-BR" dirty="0" err="1" smtClean="0"/>
-              <a:t>JQuery</a:t>
+              <a:t>end</a:t>
             </a:r>
             <a:endParaRPr lang="pt-BR" dirty="0"/>
           </a:p>
@@ -5783,6 +5797,95 @@
           <a:bodyPr/>
           <a:lstStyle/>
           <a:p>
+            <a:endParaRPr lang="pt-BR" dirty="0"/>
+          </a:p>
+        </p:txBody>
+      </p:sp>
+    </p:spTree>
+    <p:extLst>
+      <p:ext uri="{BB962C8B-B14F-4D97-AF65-F5344CB8AC3E}">
+        <p14:creationId xmlns:p14="http://schemas.microsoft.com/office/powerpoint/2010/main" val="1376429059"/>
+      </p:ext>
+    </p:extLst>
+  </p:cSld>
+  <p:clrMapOvr>
+    <a:masterClrMapping/>
+  </p:clrMapOvr>
+  <p:timing>
+    <p:tnLst>
+      <p:par>
+        <p:cTn id="1" dur="indefinite" restart="never" nodeType="tmRoot"/>
+      </p:par>
+    </p:tnLst>
+  </p:timing>
+</p:sld>
+</file>
+
+<file path=ppt/slides/slide6.xml><?xml version="1.0" encoding="utf-8"?>
+<p:sld xmlns:a="http://schemas.openxmlformats.org/drawingml/2006/main" xmlns:r="http://schemas.openxmlformats.org/officeDocument/2006/relationships" xmlns:p="http://schemas.openxmlformats.org/presentationml/2006/main">
+  <p:cSld>
+    <p:spTree>
+      <p:nvGrpSpPr>
+        <p:cNvPr id="1" name=""/>
+        <p:cNvGrpSpPr/>
+        <p:nvPr/>
+      </p:nvGrpSpPr>
+      <p:grpSpPr>
+        <a:xfrm>
+          <a:off x="0" y="0"/>
+          <a:ext cx="0" cy="0"/>
+          <a:chOff x="0" y="0"/>
+          <a:chExt cx="0" cy="0"/>
+        </a:xfrm>
+      </p:grpSpPr>
+      <p:sp>
+        <p:nvSpPr>
+          <p:cNvPr id="4" name="Título 3"/>
+          <p:cNvSpPr>
+            <a:spLocks noGrp="1"/>
+          </p:cNvSpPr>
+          <p:nvPr>
+            <p:ph type="title"/>
+          </p:nvPr>
+        </p:nvSpPr>
+        <p:spPr>
+          <a:xfrm>
+            <a:off x="684212" y="685800"/>
+            <a:ext cx="8534400" cy="1507067"/>
+          </a:xfrm>
+        </p:spPr>
+        <p:txBody>
+          <a:bodyPr/>
+          <a:lstStyle/>
+          <a:p>
+            <a:r>
+              <a:rPr lang="pt-BR" dirty="0" err="1" smtClean="0"/>
+              <a:t>JQuery</a:t>
+            </a:r>
+            <a:endParaRPr lang="pt-BR" dirty="0"/>
+          </a:p>
+        </p:txBody>
+      </p:sp>
+      <p:sp>
+        <p:nvSpPr>
+          <p:cNvPr id="5" name="Espaço Reservado para Conteúdo 4"/>
+          <p:cNvSpPr>
+            <a:spLocks noGrp="1"/>
+          </p:cNvSpPr>
+          <p:nvPr>
+            <p:ph idx="1"/>
+          </p:nvPr>
+        </p:nvSpPr>
+        <p:spPr>
+          <a:xfrm>
+            <a:off x="684212" y="2753591"/>
+            <a:ext cx="8534400" cy="3615267"/>
+          </a:xfrm>
+        </p:spPr>
+        <p:txBody>
+          <a:bodyPr/>
+          <a:lstStyle/>
+          <a:p>
             <a:r>
               <a:rPr lang="pt-BR" dirty="0"/>
               <a:t>Biblioteca Open </a:t>
@@ -5814,7 +5917,6 @@
               <a:rPr lang="pt-BR" dirty="0" smtClean="0"/>
               <a:t>e manipulação de eventos</a:t>
             </a:r>
-            <a:endParaRPr lang="pt-BR" dirty="0" smtClean="0"/>
           </a:p>
           <a:p>
             <a:r>
@@ -6029,7 +6131,7 @@
 </p:sld>
 </file>
 
-<file path=ppt/slides/slide6.xml><?xml version="1.0" encoding="utf-8"?>
+<file path=ppt/slides/slide7.xml><?xml version="1.0" encoding="utf-8"?>
 <p:sld xmlns:a="http://schemas.openxmlformats.org/drawingml/2006/main" xmlns:r="http://schemas.openxmlformats.org/officeDocument/2006/relationships" xmlns:p="http://schemas.openxmlformats.org/presentationml/2006/main">
   <p:cSld>
     <p:spTree>
@@ -6177,7 +6279,7 @@
 </p:sld>
 </file>
 
-<file path=ppt/slides/slide7.xml><?xml version="1.0" encoding="utf-8"?>
+<file path=ppt/slides/slide8.xml><?xml version="1.0" encoding="utf-8"?>
 <p:sld xmlns:a="http://schemas.openxmlformats.org/drawingml/2006/main" xmlns:r="http://schemas.openxmlformats.org/officeDocument/2006/relationships" xmlns:p="http://schemas.openxmlformats.org/presentationml/2006/main">
   <p:cSld>
     <p:spTree>
@@ -6247,9 +6349,192 @@
           <a:lstStyle/>
           <a:p>
             <a:r>
+              <a:rPr lang="pt-BR" dirty="0" smtClean="0"/>
+              <a:t>Utiliza </a:t>
+            </a:r>
+            <a:r>
+              <a:rPr lang="pt-BR" dirty="0" err="1" smtClean="0"/>
+              <a:t>Jquery</a:t>
+            </a:r>
+            <a:endParaRPr lang="pt-BR" dirty="0" smtClean="0"/>
+          </a:p>
+          <a:p>
+            <a:r>
+              <a:rPr lang="pt-BR" dirty="0">
+                <a:hlinkClick r:id="rId2"/>
+              </a:rPr>
+              <a:t>http://semantic-ui.com/introduction/getting-started.html</a:t>
+            </a:r>
+            <a:endParaRPr lang="pt-BR" dirty="0"/>
+          </a:p>
+          <a:p>
+            <a:endParaRPr lang="pt-BR" dirty="0" smtClean="0"/>
+          </a:p>
+          <a:p>
+            <a:endParaRPr lang="pt-BR" dirty="0"/>
+          </a:p>
+        </p:txBody>
+      </p:sp>
+    </p:spTree>
+    <p:extLst>
+      <p:ext uri="{BB962C8B-B14F-4D97-AF65-F5344CB8AC3E}">
+        <p14:creationId xmlns:p14="http://schemas.microsoft.com/office/powerpoint/2010/main" val="380857669"/>
+      </p:ext>
+    </p:extLst>
+  </p:cSld>
+  <p:clrMapOvr>
+    <a:masterClrMapping/>
+  </p:clrMapOvr>
+  <p:timing>
+    <p:tnLst>
+      <p:par>
+        <p:cTn id="1" dur="indefinite" restart="never" nodeType="tmRoot"/>
+      </p:par>
+    </p:tnLst>
+  </p:timing>
+</p:sld>
+</file>
+
+<file path=ppt/slides/slide9.xml><?xml version="1.0" encoding="utf-8"?>
+<p:sld xmlns:a="http://schemas.openxmlformats.org/drawingml/2006/main" xmlns:r="http://schemas.openxmlformats.org/officeDocument/2006/relationships" xmlns:p="http://schemas.openxmlformats.org/presentationml/2006/main">
+  <p:cSld>
+    <p:spTree>
+      <p:nvGrpSpPr>
+        <p:cNvPr id="1" name=""/>
+        <p:cNvGrpSpPr/>
+        <p:nvPr/>
+      </p:nvGrpSpPr>
+      <p:grpSpPr>
+        <a:xfrm>
+          <a:off x="0" y="0"/>
+          <a:ext cx="0" cy="0"/>
+          <a:chOff x="0" y="0"/>
+          <a:chExt cx="0" cy="0"/>
+        </a:xfrm>
+      </p:grpSpPr>
+      <p:sp>
+        <p:nvSpPr>
+          <p:cNvPr id="4" name="Título 3"/>
+          <p:cNvSpPr>
+            <a:spLocks noGrp="1"/>
+          </p:cNvSpPr>
+          <p:nvPr>
+            <p:ph type="title"/>
+          </p:nvPr>
+        </p:nvSpPr>
+        <p:spPr>
+          <a:xfrm>
+            <a:off x="684212" y="685800"/>
+            <a:ext cx="8534400" cy="1507067"/>
+          </a:xfrm>
+        </p:spPr>
+        <p:txBody>
+          <a:bodyPr/>
+          <a:lstStyle/>
+          <a:p>
+            <a:r>
+              <a:rPr lang="pt-BR" dirty="0" smtClean="0"/>
+              <a:t>Outros Frameworks</a:t>
+            </a:r>
+            <a:endParaRPr lang="pt-BR" dirty="0"/>
+          </a:p>
+        </p:txBody>
+      </p:sp>
+      <p:sp>
+        <p:nvSpPr>
+          <p:cNvPr id="5" name="Espaço Reservado para Conteúdo 4"/>
+          <p:cNvSpPr>
+            <a:spLocks noGrp="1"/>
+          </p:cNvSpPr>
+          <p:nvPr>
+            <p:ph idx="1"/>
+          </p:nvPr>
+        </p:nvSpPr>
+        <p:spPr>
+          <a:xfrm>
+            <a:off x="684212" y="2753591"/>
+            <a:ext cx="8534400" cy="3615267"/>
+          </a:xfrm>
+        </p:spPr>
+        <p:txBody>
+          <a:bodyPr/>
+          <a:lstStyle/>
+          <a:p>
+            <a:r>
+              <a:rPr lang="pt-BR" dirty="0" err="1" smtClean="0"/>
+              <a:t>Bootstrap</a:t>
+            </a:r>
+            <a:r>
               <a:rPr lang="pt-BR" dirty="0"/>
-              <a:t>http://semantic-ui.com/introduction/getting-started.html</a:t>
-            </a:r>
+              <a:t>: </a:t>
+            </a:r>
+            <a:endParaRPr lang="pt-BR" dirty="0" smtClean="0"/>
+          </a:p>
+          <a:p>
+            <a:pPr lvl="1"/>
+            <a:r>
+              <a:rPr lang="pt-BR" dirty="0" smtClean="0"/>
+              <a:t>Atualmente é o framework mais utilizado no mercado</a:t>
+            </a:r>
+          </a:p>
+          <a:p>
+            <a:pPr lvl="1"/>
+            <a:r>
+              <a:rPr lang="pt-BR" dirty="0" smtClean="0"/>
+              <a:t>Link: </a:t>
+            </a:r>
+            <a:r>
+              <a:rPr lang="pt-BR" dirty="0" smtClean="0">
+                <a:hlinkClick r:id="rId2"/>
+              </a:rPr>
+              <a:t>http</a:t>
+            </a:r>
+            <a:r>
+              <a:rPr lang="pt-BR" dirty="0">
+                <a:hlinkClick r:id="rId2"/>
+              </a:rPr>
+              <a:t>://getbootstrap.com/</a:t>
+            </a:r>
+            <a:endParaRPr lang="pt-BR" dirty="0"/>
+          </a:p>
+          <a:p>
+            <a:endParaRPr lang="pt-BR" dirty="0" smtClean="0"/>
+          </a:p>
+          <a:p>
+            <a:r>
+              <a:rPr lang="pt-BR" dirty="0"/>
+              <a:t>Materialize: </a:t>
+            </a:r>
+            <a:endParaRPr lang="pt-BR" dirty="0" smtClean="0"/>
+          </a:p>
+          <a:p>
+            <a:pPr lvl="1"/>
+            <a:r>
+              <a:rPr lang="pt-BR" dirty="0" smtClean="0"/>
+              <a:t>Desenvolvido pela Google</a:t>
+            </a:r>
+          </a:p>
+          <a:p>
+            <a:pPr lvl="1"/>
+            <a:r>
+              <a:rPr lang="pt-BR" dirty="0" smtClean="0"/>
+              <a:t>Ainda na versão Beta</a:t>
+            </a:r>
+          </a:p>
+          <a:p>
+            <a:pPr lvl="1"/>
+            <a:r>
+              <a:rPr lang="pt-BR" dirty="0" smtClean="0"/>
+              <a:t>Link: http</a:t>
+            </a:r>
+            <a:r>
+              <a:rPr lang="pt-BR" dirty="0"/>
+              <a:t>://materializecss.com/</a:t>
+            </a:r>
+            <a:endParaRPr lang="pt-BR" dirty="0" smtClean="0"/>
+          </a:p>
+          <a:p>
+            <a:endParaRPr lang="pt-BR" dirty="0"/>
           </a:p>
         </p:txBody>
       </p:sp>

</xml_diff>

<commit_message>
Reformulação do slide de agenda
</commit_message>
<xml_diff>
--- a/front-end.pptx
+++ b/front-end.pptx
@@ -5696,7 +5696,6 @@
               <a:rPr lang="pt-BR" dirty="0" smtClean="0"/>
               <a:t>Garrett em 2005</a:t>
             </a:r>
-            <a:endParaRPr lang="pt-BR" dirty="0" smtClean="0"/>
           </a:p>
           <a:p>
             <a:r>
@@ -6627,7 +6626,9 @@
           </a:xfrm>
         </p:spPr>
         <p:txBody>
-          <a:bodyPr/>
+          <a:bodyPr>
+            <a:normAutofit fontScale="92500" lnSpcReduction="10000"/>
+          </a:bodyPr>
           <a:lstStyle/>
           <a:p>
             <a:r>
@@ -6638,14 +6639,46 @@
           <a:p>
             <a:r>
               <a:rPr lang="pt-BR" dirty="0" smtClean="0"/>
-              <a:t>Resumo - Desenvolvimento WEB</a:t>
-            </a:r>
-          </a:p>
-          <a:p>
+              <a:t>Desenvolvimento WEB – História</a:t>
+            </a:r>
+          </a:p>
+          <a:p>
+            <a:r>
+              <a:rPr lang="pt-BR" dirty="0"/>
+              <a:t>Desenvolvimento WEB – </a:t>
+            </a:r>
             <a:r>
               <a:rPr lang="pt-BR" dirty="0" smtClean="0"/>
-              <a:t>Tecnologias essenciais ao desenvolvimento FRONT-END</a:t>
-            </a:r>
+              <a:t>Arquitetura</a:t>
+            </a:r>
+          </a:p>
+          <a:p>
+            <a:r>
+              <a:rPr lang="pt-BR" dirty="0" smtClean="0"/>
+              <a:t>Desenvolvimento WEB – Front </a:t>
+            </a:r>
+            <a:r>
+              <a:rPr lang="pt-BR" dirty="0" err="1" smtClean="0"/>
+              <a:t>End</a:t>
+            </a:r>
+            <a:endParaRPr lang="pt-BR" dirty="0" smtClean="0"/>
+          </a:p>
+          <a:p>
+            <a:r>
+              <a:rPr lang="pt-BR" dirty="0" smtClean="0"/>
+              <a:t>Tecnologias essenciais ao desenvolvimento </a:t>
+            </a:r>
+            <a:r>
+              <a:rPr lang="pt-BR" dirty="0" smtClean="0"/>
+              <a:t>FRONT-END</a:t>
+            </a:r>
+          </a:p>
+          <a:p>
+            <a:r>
+              <a:rPr lang="pt-BR" dirty="0" err="1" smtClean="0"/>
+              <a:t>Jquery</a:t>
+            </a:r>
+            <a:endParaRPr lang="pt-BR" dirty="0" smtClean="0"/>
           </a:p>
           <a:p>
             <a:r>
@@ -6843,15 +6876,7 @@
           <a:p>
             <a:r>
               <a:rPr lang="pt-BR" dirty="0" smtClean="0"/>
-              <a:t>Desenvolvimento </a:t>
-            </a:r>
-            <a:r>
-              <a:rPr lang="pt-BR" dirty="0" smtClean="0"/>
-              <a:t>web – Hist</a:t>
-            </a:r>
-            <a:r>
-              <a:rPr lang="pt-BR" dirty="0" smtClean="0"/>
-              <a:t>ória</a:t>
+              <a:t>Desenvolvimento web – História</a:t>
             </a:r>
             <a:endParaRPr lang="pt-BR" dirty="0"/>
           </a:p>
@@ -7100,11 +7125,7 @@
           <a:p>
             <a:r>
               <a:rPr lang="pt-BR" dirty="0" smtClean="0"/>
-              <a:t>Desenvolvimento </a:t>
-            </a:r>
-            <a:r>
-              <a:rPr lang="pt-BR" dirty="0" smtClean="0"/>
-              <a:t>web – arquitetura</a:t>
+              <a:t>Desenvolvimento web – arquitetura</a:t>
             </a:r>
             <a:endParaRPr lang="pt-BR" dirty="0"/>
           </a:p>
@@ -7318,7 +7339,6 @@
               <a:rPr lang="pt-BR" dirty="0" smtClean="0"/>
               <a:t>Atua na camada “cliente” na arquitetura cliente/servidor</a:t>
             </a:r>
-            <a:endParaRPr lang="pt-BR" dirty="0" smtClean="0"/>
           </a:p>
           <a:p>
             <a:r>
@@ -7791,11 +7811,7 @@
           <a:p>
             <a:r>
               <a:rPr lang="pt-BR" dirty="0" smtClean="0"/>
-              <a:t>Linguagem de programação executad</a:t>
-            </a:r>
-            <a:r>
-              <a:rPr lang="pt-BR" dirty="0" smtClean="0"/>
-              <a:t>a no </a:t>
+              <a:t>Linguagem de programação executada no </a:t>
             </a:r>
             <a:r>
               <a:rPr lang="pt-BR" dirty="0" err="1" smtClean="0"/>

</xml_diff>